<commit_message>
Changed the threshold to 4.0 for better color maps
</commit_message>
<xml_diff>
--- a/Presentation/Erathquake-risk-mapping.pptx
+++ b/Presentation/Erathquake-risk-mapping.pptx
@@ -115,6 +115,11 @@
       </a:defRPr>
     </a:lvl9pPr>
   </p:defaultTextStyle>
+  <p:extLst>
+    <p:ext uri="{EFAFB233-063F-42B5-8137-9DF3F51BA10A}">
+      <p15:sldGuideLst xmlns:p15="http://schemas.microsoft.com/office/powerpoint/2012/main"/>
+    </p:ext>
+  </p:extLst>
 </p:presentation>
 </file>
 
@@ -4356,13 +4361,8 @@
             </a:r>
             <a:r>
               <a:rPr lang="en-AU" dirty="0"/>
-              <a:t>/Regional Risk Assessment/Data-Driven Hazard </a:t>
-            </a:r>
-            <a:r>
-              <a:rPr lang="en-AU" dirty="0" err="1"/>
-              <a:t>Modeling</a:t>
-            </a:r>
-            <a:endParaRPr lang="en-AU" dirty="0"/>
+              <a:t>/Regional Risk Assessment/Data-Driven Hazard Modelling</a:t>
+            </a:r>
           </a:p>
           <a:p>
             <a:r>
@@ -5065,7 +5065,7 @@
           <a:p>
             <a:r>
               <a:rPr lang="en-AU" dirty="0"/>
-              <a:t>Built binary classifier: high-risk zones (e.g., magnitude threshold)</a:t>
+              <a:t>Built binary classifier: high-risk zones (magnitude threshold)</a:t>
             </a:r>
           </a:p>
           <a:p>
@@ -5075,12 +5075,14 @@
             </a:r>
           </a:p>
           <a:p>
+            <a:pPr lvl="1"/>
             <a:r>
               <a:rPr lang="en-AU" dirty="0"/>
               <a:t>Train-test split</a:t>
             </a:r>
           </a:p>
           <a:p>
+            <a:pPr lvl="1"/>
             <a:r>
               <a:rPr lang="en-AU" dirty="0" err="1"/>
               <a:t>StandardScaler</a:t>
@@ -5093,13 +5095,21 @@
           <a:p>
             <a:r>
               <a:rPr lang="en-AU" dirty="0"/>
-              <a:t>Model: Logistic Regression or Random Forest</a:t>
-            </a:r>
-          </a:p>
-          <a:p>
+              <a:t>Model: Random </a:t>
+            </a:r>
+            <a:r>
+              <a:rPr lang="en-AU"/>
+              <a:t>Forest Classifier (</a:t>
+            </a:r>
             <a:r>
               <a:rPr lang="en-AU" dirty="0"/>
-              <a:t>Evaluation: Precision, Recall, F1—balanced and robust despite class imbalance</a:t>
+              <a:t>or Logistic Regression)</a:t>
+            </a:r>
+          </a:p>
+          <a:p>
+            <a:r>
+              <a:rPr lang="en-AU" dirty="0"/>
+              <a:t>Evaluation: Precision, Recall, F1-balanced and robust despite class imbalance, Confusion matrix</a:t>
             </a:r>
           </a:p>
           <a:p>

</xml_diff>